<commit_message>
small change to fig in sec2
</commit_message>
<xml_diff>
--- a/figs/phases.pptx
+++ b/figs/phases.pptx
@@ -288,7 +288,7 @@
           <a:p>
             <a:fld id="{CE7AE816-EB0B-FC41-8C58-C049851288C0}" type="datetimeFigureOut">
               <a:rPr lang="en-US" smtClean="0"/>
-              <a:t>12/5/13</a:t>
+              <a:t>12/6/13</a:t>
             </a:fld>
             <a:endParaRPr lang="en-US"/>
           </a:p>
@@ -458,7 +458,7 @@
           <a:p>
             <a:fld id="{CE7AE816-EB0B-FC41-8C58-C049851288C0}" type="datetimeFigureOut">
               <a:rPr lang="en-US" smtClean="0"/>
-              <a:t>12/5/13</a:t>
+              <a:t>12/6/13</a:t>
             </a:fld>
             <a:endParaRPr lang="en-US"/>
           </a:p>
@@ -638,7 +638,7 @@
           <a:p>
             <a:fld id="{CE7AE816-EB0B-FC41-8C58-C049851288C0}" type="datetimeFigureOut">
               <a:rPr lang="en-US" smtClean="0"/>
-              <a:t>12/5/13</a:t>
+              <a:t>12/6/13</a:t>
             </a:fld>
             <a:endParaRPr lang="en-US"/>
           </a:p>
@@ -808,7 +808,7 @@
           <a:p>
             <a:fld id="{CE7AE816-EB0B-FC41-8C58-C049851288C0}" type="datetimeFigureOut">
               <a:rPr lang="en-US" smtClean="0"/>
-              <a:t>12/5/13</a:t>
+              <a:t>12/6/13</a:t>
             </a:fld>
             <a:endParaRPr lang="en-US"/>
           </a:p>
@@ -1054,7 +1054,7 @@
           <a:p>
             <a:fld id="{CE7AE816-EB0B-FC41-8C58-C049851288C0}" type="datetimeFigureOut">
               <a:rPr lang="en-US" smtClean="0"/>
-              <a:t>12/5/13</a:t>
+              <a:t>12/6/13</a:t>
             </a:fld>
             <a:endParaRPr lang="en-US"/>
           </a:p>
@@ -1342,7 +1342,7 @@
           <a:p>
             <a:fld id="{CE7AE816-EB0B-FC41-8C58-C049851288C0}" type="datetimeFigureOut">
               <a:rPr lang="en-US" smtClean="0"/>
-              <a:t>12/5/13</a:t>
+              <a:t>12/6/13</a:t>
             </a:fld>
             <a:endParaRPr lang="en-US"/>
           </a:p>
@@ -1764,7 +1764,7 @@
           <a:p>
             <a:fld id="{CE7AE816-EB0B-FC41-8C58-C049851288C0}" type="datetimeFigureOut">
               <a:rPr lang="en-US" smtClean="0"/>
-              <a:t>12/5/13</a:t>
+              <a:t>12/6/13</a:t>
             </a:fld>
             <a:endParaRPr lang="en-US"/>
           </a:p>
@@ -1882,7 +1882,7 @@
           <a:p>
             <a:fld id="{CE7AE816-EB0B-FC41-8C58-C049851288C0}" type="datetimeFigureOut">
               <a:rPr lang="en-US" smtClean="0"/>
-              <a:t>12/5/13</a:t>
+              <a:t>12/6/13</a:t>
             </a:fld>
             <a:endParaRPr lang="en-US"/>
           </a:p>
@@ -1977,7 +1977,7 @@
           <a:p>
             <a:fld id="{CE7AE816-EB0B-FC41-8C58-C049851288C0}" type="datetimeFigureOut">
               <a:rPr lang="en-US" smtClean="0"/>
-              <a:t>12/5/13</a:t>
+              <a:t>12/6/13</a:t>
             </a:fld>
             <a:endParaRPr lang="en-US"/>
           </a:p>
@@ -2254,7 +2254,7 @@
           <a:p>
             <a:fld id="{CE7AE816-EB0B-FC41-8C58-C049851288C0}" type="datetimeFigureOut">
               <a:rPr lang="en-US" smtClean="0"/>
-              <a:t>12/5/13</a:t>
+              <a:t>12/6/13</a:t>
             </a:fld>
             <a:endParaRPr lang="en-US"/>
           </a:p>
@@ -2507,7 +2507,7 @@
           <a:p>
             <a:fld id="{CE7AE816-EB0B-FC41-8C58-C049851288C0}" type="datetimeFigureOut">
               <a:rPr lang="en-US" smtClean="0"/>
-              <a:t>12/5/13</a:t>
+              <a:t>12/6/13</a:t>
             </a:fld>
             <a:endParaRPr lang="en-US"/>
           </a:p>
@@ -2720,7 +2720,7 @@
           <a:p>
             <a:fld id="{CE7AE816-EB0B-FC41-8C58-C049851288C0}" type="datetimeFigureOut">
               <a:rPr lang="en-US" smtClean="0"/>
-              <a:t>12/5/13</a:t>
+              <a:t>12/6/13</a:t>
             </a:fld>
             <a:endParaRPr lang="en-US"/>
           </a:p>
@@ -3097,6 +3097,50 @@
       </p:grpSpPr>
       <p:sp>
         <p:nvSpPr>
+          <p:cNvPr id="22" name="Left-Right Arrow 21"/>
+          <p:cNvSpPr/>
+          <p:nvPr/>
+        </p:nvSpPr>
+        <p:spPr>
+          <a:xfrm>
+            <a:off x="585689" y="4179035"/>
+            <a:ext cx="7993544" cy="762000"/>
+          </a:xfrm>
+          <a:prstGeom prst="leftRightArrow">
+            <a:avLst/>
+          </a:prstGeom>
+        </p:spPr>
+        <p:style>
+          <a:lnRef idx="2">
+            <a:schemeClr val="accent1">
+              <a:shade val="50000"/>
+            </a:schemeClr>
+          </a:lnRef>
+          <a:fillRef idx="1">
+            <a:schemeClr val="accent1"/>
+          </a:fillRef>
+          <a:effectRef idx="0">
+            <a:schemeClr val="accent1"/>
+          </a:effectRef>
+          <a:fontRef idx="minor">
+            <a:schemeClr val="lt1"/>
+          </a:fontRef>
+        </p:style>
+        <p:txBody>
+          <a:bodyPr rtlCol="0" anchor="ctr"/>
+          <a:lstStyle/>
+          <a:p>
+            <a:pPr algn="ctr"/>
+            <a:r>
+              <a:rPr lang="en-US" b="1" dirty="0" smtClean="0"/>
+              <a:t>GOVERNANCE &amp; RISK MANAGEMENT</a:t>
+            </a:r>
+            <a:endParaRPr lang="en-US" b="1" dirty="0"/>
+          </a:p>
+        </p:txBody>
+      </p:sp>
+      <p:sp>
+        <p:nvSpPr>
           <p:cNvPr id="4" name="Rectangle 3"/>
           <p:cNvSpPr/>
           <p:nvPr/>
@@ -3429,7 +3473,7 @@
         </p:nvSpPr>
         <p:spPr>
           <a:xfrm>
-            <a:off x="570749" y="3040529"/>
+            <a:off x="570749" y="3548523"/>
             <a:ext cx="8005494" cy="762000"/>
           </a:xfrm>
           <a:prstGeom prst="leftRightArrow">
@@ -3467,50 +3511,6 @@
       </p:sp>
       <p:sp>
         <p:nvSpPr>
-          <p:cNvPr id="22" name="Left-Right Arrow 21"/>
-          <p:cNvSpPr/>
-          <p:nvPr/>
-        </p:nvSpPr>
-        <p:spPr>
-          <a:xfrm>
-            <a:off x="570748" y="3925038"/>
-            <a:ext cx="7993544" cy="762000"/>
-          </a:xfrm>
-          <a:prstGeom prst="leftRightArrow">
-            <a:avLst/>
-          </a:prstGeom>
-        </p:spPr>
-        <p:style>
-          <a:lnRef idx="2">
-            <a:schemeClr val="accent1">
-              <a:shade val="50000"/>
-            </a:schemeClr>
-          </a:lnRef>
-          <a:fillRef idx="1">
-            <a:schemeClr val="accent1"/>
-          </a:fillRef>
-          <a:effectRef idx="0">
-            <a:schemeClr val="accent1"/>
-          </a:effectRef>
-          <a:fontRef idx="minor">
-            <a:schemeClr val="lt1"/>
-          </a:fontRef>
-        </p:style>
-        <p:txBody>
-          <a:bodyPr rtlCol="0" anchor="ctr"/>
-          <a:lstStyle/>
-          <a:p>
-            <a:pPr algn="ctr"/>
-            <a:r>
-              <a:rPr lang="en-US" b="1" dirty="0" smtClean="0"/>
-              <a:t>GOVERNANCE &amp; RISK MANAGEMENT</a:t>
-            </a:r>
-            <a:endParaRPr lang="en-US" b="1" dirty="0"/>
-          </a:p>
-        </p:txBody>
-      </p:sp>
-      <p:sp>
-        <p:nvSpPr>
           <p:cNvPr id="23" name="TextBox 22"/>
           <p:cNvSpPr txBox="1"/>
           <p:nvPr/>
@@ -3534,6 +3534,50 @@
             <a:r>
               <a:rPr lang="en-US" b="1" dirty="0" smtClean="0"/>
               <a:t>RELEASE</a:t>
+            </a:r>
+            <a:endParaRPr lang="en-US" b="1" dirty="0"/>
+          </a:p>
+        </p:txBody>
+      </p:sp>
+      <p:sp>
+        <p:nvSpPr>
+          <p:cNvPr id="13" name="Left-Right Arrow 12"/>
+          <p:cNvSpPr/>
+          <p:nvPr/>
+        </p:nvSpPr>
+        <p:spPr>
+          <a:xfrm>
+            <a:off x="3517149" y="2938923"/>
+            <a:ext cx="5059094" cy="762000"/>
+          </a:xfrm>
+          <a:prstGeom prst="leftRightArrow">
+            <a:avLst/>
+          </a:prstGeom>
+        </p:spPr>
+        <p:style>
+          <a:lnRef idx="2">
+            <a:schemeClr val="accent5">
+              <a:shade val="50000"/>
+            </a:schemeClr>
+          </a:lnRef>
+          <a:fillRef idx="1">
+            <a:schemeClr val="accent5"/>
+          </a:fillRef>
+          <a:effectRef idx="0">
+            <a:schemeClr val="accent5"/>
+          </a:effectRef>
+          <a:fontRef idx="minor">
+            <a:schemeClr val="lt1"/>
+          </a:fontRef>
+        </p:style>
+        <p:txBody>
+          <a:bodyPr rtlCol="0" anchor="ctr"/>
+          <a:lstStyle/>
+          <a:p>
+            <a:pPr algn="ctr"/>
+            <a:r>
+              <a:rPr lang="en-US" b="1" dirty="0" smtClean="0"/>
+              <a:t>WORKFORCE MANAGEMENT</a:t>
             </a:r>
             <a:endParaRPr lang="en-US" b="1" dirty="0"/>
           </a:p>

</xml_diff>